<commit_message>
SCD Poster. Nick's modifications.
</commit_message>
<xml_diff>
--- a/Presentations/ECNS 2015/SCDPoster.pptx
+++ b/Presentations/ECNS 2015/SCDPoster.pptx
@@ -142,7 +142,7 @@
   </p:defaultTextStyle>
   <p:extLst>
     <p:ext uri="{EFAFB233-063F-42B5-8137-9DF3F51BA10A}">
-      <p15:sldGuideLst xmlns:p15="http://schemas.microsoft.com/office/powerpoint/2012/main">
+      <p15:sldGuideLst xmlns:p15="http://schemas.microsoft.com/office/powerpoint/2012/main" xmlns="">
         <p15:guide id="1" orient="horz" pos="13488">
           <p15:clr>
             <a:srgbClr val="A4A3A4"/>
@@ -156,7 +156,7 @@
       </p15:sldGuideLst>
     </p:ext>
     <p:ext uri="{2D200454-40CA-4A62-9FC3-DE9A4176ACB9}">
-      <p15:notesGuideLst xmlns:p15="http://schemas.microsoft.com/office/powerpoint/2012/main">
+      <p15:notesGuideLst xmlns:p15="http://schemas.microsoft.com/office/powerpoint/2012/main" xmlns="">
         <p15:guide id="1" orient="horz" pos="3127">
           <p15:clr>
             <a:srgbClr val="A4A3A4"/>
@@ -256,7 +256,7 @@
             <a:fld id="{E78E1D5F-7523-4815-A670-60864F601D30}" type="datetimeFigureOut">
               <a:rPr lang="en-GB" smtClean="0"/>
               <a:pPr/>
-              <a:t>18/08/2015</a:t>
+              <a:t>18/08/15</a:t>
             </a:fld>
             <a:endParaRPr lang="en-GB"/>
           </a:p>
@@ -423,7 +423,7 @@
             <a:fld id="{376B4F07-E738-4DFD-883D-BE3839CD703B}" type="datetimeFigureOut">
               <a:rPr lang="en-GB" smtClean="0"/>
               <a:pPr/>
-              <a:t>18/08/2015</a:t>
+              <a:t>18/08/15</a:t>
             </a:fld>
             <a:endParaRPr lang="en-GB"/>
           </a:p>
@@ -3188,14 +3188,14 @@
           <p:nvPr>
             <p:extLst>
               <p:ext uri="{D42A27DB-BD31-4B8C-83A1-F6EECF244321}">
-                <p14:modId xmlns:p14="http://schemas.microsoft.com/office/powerpoint/2010/main" val="2060255920"/>
+                <p14:modId xmlns:p14="http://schemas.microsoft.com/office/powerpoint/2010/main" val="1893103062"/>
               </p:ext>
             </p:extLst>
           </p:nvPr>
         </p:nvGraphicFramePr>
         <p:xfrm>
           <a:off x="1066800" y="9140097"/>
-          <a:ext cx="28194000" cy="35045904"/>
+          <a:ext cx="28194000" cy="35777452"/>
         </p:xfrm>
         <a:graphic>
           <a:graphicData uri="http://schemas.openxmlformats.org/drawingml/2006/table">
@@ -3722,10 +3722,10 @@
                           <a:ea typeface="+mn-ea"/>
                           <a:cs typeface="Arial"/>
                         </a:rPr>
-                        <a:t> and Mantid so that users can visually drive the data reduction and analysis </a:t>
-                      </a:r>
-                      <a:r>
-                        <a:rPr lang="en-GB" sz="2400" b="0" i="0" kern="1200" dirty="0" smtClean="0">
+                        <a:t> and Mantid so that users can visually drive the data reduction and analysis process. </a:t>
+                      </a:r>
+                      <a:r>
+                        <a:rPr lang="en-GB" sz="2400" b="0" i="0" kern="1200" baseline="0" dirty="0" smtClean="0">
                           <a:solidFill>
                             <a:schemeClr val="tx1"/>
                           </a:solidFill>
@@ -3734,7 +3734,7 @@
                           <a:ea typeface="+mn-ea"/>
                           <a:cs typeface="Arial"/>
                         </a:rPr>
-                        <a:t>process. </a:t>
+                        <a:t>This has required engineering and innovations on both the Mantid and VTK side of the project</a:t>
                       </a:r>
                       <a:r>
                         <a:rPr lang="en-GB" sz="2400" b="0" i="0" kern="1200" baseline="0" dirty="0" smtClean="0">
@@ -3746,10 +3746,10 @@
                           <a:ea typeface="+mn-ea"/>
                           <a:cs typeface="Arial"/>
                         </a:rPr>
-                        <a:t>This </a:t>
-                      </a:r>
-                      <a:r>
-                        <a:rPr lang="en-GB" sz="2400" b="0" i="0" kern="1200" baseline="0" dirty="0" smtClean="0">
+                        <a:t>. We have been working with </a:t>
+                      </a:r>
+                      <a:r>
+                        <a:rPr lang="en-GB" sz="2400" b="0" i="0" kern="1200" baseline="0" dirty="0" err="1" smtClean="0">
                           <a:solidFill>
                             <a:schemeClr val="tx1"/>
                           </a:solidFill>
@@ -3758,8 +3758,53 @@
                           <a:ea typeface="+mn-ea"/>
                           <a:cs typeface="Arial"/>
                         </a:rPr>
-                        <a:t>has required engineering and innovations on both the Mantid and VTK side of the project.</a:t>
-                      </a:r>
+                        <a:t>Kitware</a:t>
+                      </a:r>
+                      <a:r>
+                        <a:rPr lang="en-GB" sz="2400" b="0" i="0" kern="1200" baseline="0" dirty="0" smtClean="0">
+                          <a:solidFill>
+                            <a:schemeClr val="tx1"/>
+                          </a:solidFill>
+                          <a:effectLst/>
+                          <a:latin typeface="+mn-lt"/>
+                          <a:ea typeface="+mn-ea"/>
+                          <a:cs typeface="Arial"/>
+                        </a:rPr>
+                        <a:t>, the developers of </a:t>
+                      </a:r>
+                      <a:r>
+                        <a:rPr lang="en-GB" sz="2400" b="0" i="0" kern="1200" baseline="0" dirty="0" err="1" smtClean="0">
+                          <a:solidFill>
+                            <a:schemeClr val="tx1"/>
+                          </a:solidFill>
+                          <a:effectLst/>
+                          <a:latin typeface="+mn-lt"/>
+                          <a:ea typeface="+mn-ea"/>
+                          <a:cs typeface="Arial"/>
+                        </a:rPr>
+                        <a:t>ParaView</a:t>
+                      </a:r>
+                      <a:r>
+                        <a:rPr lang="en-GB" sz="2400" b="0" i="0" kern="1200" baseline="0" dirty="0" smtClean="0">
+                          <a:solidFill>
+                            <a:schemeClr val="tx1"/>
+                          </a:solidFill>
+                          <a:effectLst/>
+                          <a:latin typeface="+mn-lt"/>
+                          <a:ea typeface="+mn-ea"/>
+                          <a:cs typeface="Arial"/>
+                        </a:rPr>
+                        <a:t>, to extend the capabilities of their visualization tools.</a:t>
+                      </a:r>
+                      <a:endParaRPr lang="en-GB" sz="2400" b="0" i="0" kern="1200" baseline="0" dirty="0" smtClean="0">
+                        <a:solidFill>
+                          <a:schemeClr val="tx1"/>
+                        </a:solidFill>
+                        <a:effectLst/>
+                        <a:latin typeface="+mn-lt"/>
+                        <a:ea typeface="+mn-ea"/>
+                        <a:cs typeface="Arial"/>
+                      </a:endParaRPr>
                     </a:p>
                     <a:p>
                       <a:endParaRPr kumimoji="0" lang="en-GB" sz="2400" b="0" i="0" u="none" strike="noStrike" kern="1200" cap="none" normalizeH="0" baseline="0" dirty="0" smtClean="0">
@@ -6176,8 +6221,31 @@
                           <a:effectLst/>
                           <a:latin typeface="+mn-lt"/>
                         </a:rPr>
-                        <a:t> and can drive the analysis as well as passively observe changes to underlying data.</a:t>
-                      </a:r>
+                        <a:t> and can drive the analysis as well as passively observe changes to underlying data</a:t>
+                      </a:r>
+                      <a:r>
+                        <a:rPr kumimoji="0" lang="en-US" sz="2400" b="0" i="0" u="none" strike="noStrike" kern="0" cap="none" normalizeH="0" baseline="0" dirty="0" smtClean="0">
+                          <a:ln>
+                            <a:noFill/>
+                          </a:ln>
+                          <a:solidFill>
+                            <a:schemeClr val="tx1"/>
+                          </a:solidFill>
+                          <a:effectLst/>
+                          <a:latin typeface="+mn-lt"/>
+                        </a:rPr>
+                        <a:t>.</a:t>
+                      </a:r>
+                      <a:endParaRPr kumimoji="0" lang="en-US" sz="2400" b="0" i="0" u="none" strike="noStrike" kern="0" cap="none" normalizeH="0" baseline="0" dirty="0" smtClean="0">
+                        <a:ln>
+                          <a:noFill/>
+                        </a:ln>
+                        <a:solidFill>
+                          <a:schemeClr val="tx1"/>
+                        </a:solidFill>
+                        <a:effectLst/>
+                        <a:latin typeface="+mn-lt"/>
+                      </a:endParaRPr>
                     </a:p>
                     <a:p>
                       <a:pPr marL="0" marR="0" lvl="0" indent="0" algn="l" defTabSz="4173538" rtl="0" eaLnBrk="1" fontAlgn="base" latinLnBrk="0" hangingPunct="1">
@@ -8161,32 +8229,6 @@
           </a:p>
         </p:txBody>
       </p:sp>
-      <p:pic>
-        <p:nvPicPr>
-          <p:cNvPr id="3088" name="Picture 16" descr="C:\Mantid\Documents\Images\Mantid Logo Transparent Cropped - Large.png"/>
-          <p:cNvPicPr>
-            <a:picLocks noChangeAspect="1" noChangeArrowheads="1"/>
-          </p:cNvPicPr>
-          <p:nvPr/>
-        </p:nvPicPr>
-        <p:blipFill>
-          <a:blip r:embed="rId5" cstate="print"/>
-          <a:srcRect/>
-          <a:stretch>
-            <a:fillRect/>
-          </a:stretch>
-        </p:blipFill>
-        <p:spPr bwMode="auto">
-          <a:xfrm>
-            <a:off x="917431" y="39259865"/>
-            <a:ext cx="4354168" cy="1949117"/>
-          </a:xfrm>
-          <a:prstGeom prst="rect">
-            <a:avLst/>
-          </a:prstGeom>
-          <a:noFill/>
-        </p:spPr>
-      </p:pic>
       <p:grpSp>
         <p:nvGrpSpPr>
           <p:cNvPr id="3084" name="Group 3083"/>
@@ -8278,7 +8320,7 @@
             <p:nvPr/>
           </p:nvPicPr>
           <p:blipFill>
-            <a:blip r:embed="rId6">
+            <a:blip r:embed="rId5">
               <a:extLst>
                 <a:ext uri="{28A0092B-C50C-407E-A947-70E740481C1C}">
                   <a14:useLocalDpi xmlns:a14="http://schemas.microsoft.com/office/drawing/2010/main" val="0"/>
@@ -8308,7 +8350,7 @@
         </p:nvGrpSpPr>
         <p:grpSpPr>
           <a:xfrm>
-            <a:off x="895988" y="30446876"/>
+            <a:off x="861766" y="31410993"/>
             <a:ext cx="9144000" cy="6345996"/>
             <a:chOff x="861766" y="29754809"/>
             <a:chExt cx="9144000" cy="6345996"/>
@@ -8323,7 +8365,7 @@
             <p:nvPr/>
           </p:nvPicPr>
           <p:blipFill>
-            <a:blip r:embed="rId7"/>
+            <a:blip r:embed="rId6"/>
             <a:stretch>
               <a:fillRect/>
             </a:stretch>
@@ -8396,7 +8438,7 @@
             <p:nvPr/>
           </p:nvPicPr>
           <p:blipFill>
-            <a:blip r:embed="rId8"/>
+            <a:blip r:embed="rId7"/>
             <a:stretch>
               <a:fillRect/>
             </a:stretch>
@@ -8475,7 +8517,7 @@
             <p:nvPr/>
           </p:nvPicPr>
           <p:blipFill>
-            <a:blip r:embed="rId9" cstate="print">
+            <a:blip r:embed="rId8" cstate="print">
               <a:extLst>
                 <a:ext uri="{28A0092B-C50C-407E-A947-70E740481C1C}">
                   <a14:useLocalDpi xmlns:a14="http://schemas.microsoft.com/office/drawing/2010/main" val="0"/>
@@ -8505,7 +8547,7 @@
             <p:nvPr/>
           </p:nvPicPr>
           <p:blipFill>
-            <a:blip r:embed="rId10">
+            <a:blip r:embed="rId9">
               <a:extLst>
                 <a:ext uri="{28A0092B-C50C-407E-A947-70E740481C1C}">
                   <a14:useLocalDpi xmlns:a14="http://schemas.microsoft.com/office/drawing/2010/main" val="0"/>
@@ -8671,7 +8713,7 @@
             <p:nvPr/>
           </p:nvPicPr>
           <p:blipFill>
-            <a:blip r:embed="rId11"/>
+            <a:blip r:embed="rId10"/>
             <a:stretch>
               <a:fillRect/>
             </a:stretch>
@@ -8756,7 +8798,7 @@
             <p:nvPr/>
           </p:nvPicPr>
           <p:blipFill>
-            <a:blip r:embed="rId12">
+            <a:blip r:embed="rId11">
               <a:extLst>
                 <a:ext uri="{28A0092B-C50C-407E-A947-70E740481C1C}">
                   <a14:useLocalDpi xmlns:a14="http://schemas.microsoft.com/office/drawing/2010/main" val="0"/>
@@ -8830,133 +8872,152 @@
           </p:txBody>
         </p:sp>
       </p:grpSp>
-      <p:grpSp>
-        <p:nvGrpSpPr>
-          <p:cNvPr id="12" name="Group 11"/>
-          <p:cNvGrpSpPr/>
+      <p:pic>
+        <p:nvPicPr>
+          <p:cNvPr id="3089" name="Picture 17" descr="C:\Mantid\Documents\Images\ISIS Logo - Transparent.gif"/>
+          <p:cNvPicPr>
+            <a:picLocks noChangeAspect="1" noChangeArrowheads="1"/>
+          </p:cNvPicPr>
           <p:nvPr/>
-        </p:nvGrpSpPr>
-        <p:grpSpPr>
+        </p:nvPicPr>
+        <p:blipFill>
+          <a:blip r:embed="rId12" cstate="print"/>
+          <a:srcRect/>
+          <a:stretch>
+            <a:fillRect/>
+          </a:stretch>
+        </p:blipFill>
+        <p:spPr bwMode="auto">
           <a:xfrm>
-            <a:off x="9877541" y="39395400"/>
-            <a:ext cx="19586276" cy="2457543"/>
-            <a:chOff x="8134574" y="39259865"/>
-            <a:chExt cx="19586276" cy="2457543"/>
+            <a:off x="9877541" y="39755440"/>
+            <a:ext cx="4266451" cy="1888429"/>
           </a:xfrm>
-        </p:grpSpPr>
-        <p:pic>
-          <p:nvPicPr>
-            <p:cNvPr id="3089" name="Picture 17" descr="C:\Mantid\Documents\Images\ISIS Logo - Transparent.gif"/>
-            <p:cNvPicPr>
-              <a:picLocks noChangeAspect="1" noChangeArrowheads="1"/>
-            </p:cNvPicPr>
-            <p:nvPr/>
-          </p:nvPicPr>
-          <p:blipFill>
-            <a:blip r:embed="rId13" cstate="print"/>
-            <a:srcRect/>
-            <a:stretch>
-              <a:fillRect/>
-            </a:stretch>
-          </p:blipFill>
-          <p:spPr bwMode="auto">
-            <a:xfrm>
-              <a:off x="8134574" y="39619905"/>
-              <a:ext cx="4266451" cy="1888429"/>
-            </a:xfrm>
-            <a:prstGeom prst="rect">
-              <a:avLst/>
-            </a:prstGeom>
-            <a:noFill/>
-          </p:spPr>
-        </p:pic>
-        <p:pic>
-          <p:nvPicPr>
-            <p:cNvPr id="3090" name="Picture 18" descr="C:\Mantid\Documents\Images\SNS_logo_words_trans_back.gif"/>
-            <p:cNvPicPr>
-              <a:picLocks noChangeAspect="1" noChangeArrowheads="1"/>
-            </p:cNvPicPr>
-            <p:nvPr/>
-          </p:nvPicPr>
-          <p:blipFill>
-            <a:blip r:embed="rId14" cstate="print"/>
-            <a:srcRect/>
-            <a:stretch>
-              <a:fillRect/>
-            </a:stretch>
-          </p:blipFill>
-          <p:spPr bwMode="auto">
-            <a:xfrm>
-              <a:off x="12671078" y="39259865"/>
-              <a:ext cx="3670562" cy="2457543"/>
-            </a:xfrm>
-            <a:prstGeom prst="rect">
-              <a:avLst/>
-            </a:prstGeom>
-            <a:noFill/>
-          </p:spPr>
-        </p:pic>
-        <p:pic>
-          <p:nvPicPr>
-            <p:cNvPr id="4" name="Picture 3" descr="Tessella_Logo.gif"/>
-            <p:cNvPicPr>
-              <a:picLocks noChangeAspect="1"/>
-            </p:cNvPicPr>
-            <p:nvPr/>
-          </p:nvPicPr>
-          <p:blipFill>
-            <a:blip r:embed="rId15">
-              <a:extLst>
-                <a:ext uri="{28A0092B-C50C-407E-A947-70E740481C1C}">
-                  <a14:useLocalDpi xmlns:a14="http://schemas.microsoft.com/office/drawing/2010/main" val="0"/>
-                </a:ext>
-              </a:extLst>
-            </a:blip>
-            <a:stretch>
-              <a:fillRect/>
-            </a:stretch>
-          </p:blipFill>
-          <p:spPr>
-            <a:xfrm>
-              <a:off x="21816094" y="39259865"/>
-              <a:ext cx="5904756" cy="2363985"/>
-            </a:xfrm>
-            <a:prstGeom prst="rect">
-              <a:avLst/>
-            </a:prstGeom>
-          </p:spPr>
-        </p:pic>
-        <p:pic>
-          <p:nvPicPr>
-            <p:cNvPr id="11" name="Picture 10" descr="ess_logo_transparent.png"/>
-            <p:cNvPicPr>
-              <a:picLocks noChangeAspect="1"/>
-            </p:cNvPicPr>
-            <p:nvPr/>
-          </p:nvPicPr>
-          <p:blipFill>
-            <a:blip r:embed="rId16">
-              <a:extLst>
-                <a:ext uri="{28A0092B-C50C-407E-A947-70E740481C1C}">
-                  <a14:useLocalDpi xmlns:a14="http://schemas.microsoft.com/office/drawing/2010/main" val="0"/>
-                </a:ext>
-              </a:extLst>
-            </a:blip>
-            <a:stretch>
-              <a:fillRect/>
-            </a:stretch>
-          </p:blipFill>
-          <p:spPr>
-            <a:xfrm>
-              <a:off x="16901191" y="39259865"/>
-              <a:ext cx="4482855" cy="2382215"/>
-            </a:xfrm>
-            <a:prstGeom prst="rect">
-              <a:avLst/>
-            </a:prstGeom>
-          </p:spPr>
-        </p:pic>
-      </p:grpSp>
+          <a:prstGeom prst="rect">
+            <a:avLst/>
+          </a:prstGeom>
+          <a:noFill/>
+        </p:spPr>
+      </p:pic>
+      <p:pic>
+        <p:nvPicPr>
+          <p:cNvPr id="4" name="Picture 3" descr="Tessella_Logo.gif"/>
+          <p:cNvPicPr>
+            <a:picLocks noChangeAspect="1"/>
+          </p:cNvPicPr>
+          <p:nvPr/>
+        </p:nvPicPr>
+        <p:blipFill>
+          <a:blip r:embed="rId13">
+            <a:extLst>
+              <a:ext uri="{28A0092B-C50C-407E-A947-70E740481C1C}">
+                <a14:useLocalDpi xmlns:a14="http://schemas.microsoft.com/office/drawing/2010/main" val="0"/>
+              </a:ext>
+            </a:extLst>
+          </a:blip>
+          <a:stretch>
+            <a:fillRect/>
+          </a:stretch>
+        </p:blipFill>
+        <p:spPr>
+          <a:xfrm>
+            <a:off x="23559061" y="39395400"/>
+            <a:ext cx="5904756" cy="2363985"/>
+          </a:xfrm>
+          <a:prstGeom prst="rect">
+            <a:avLst/>
+          </a:prstGeom>
+        </p:spPr>
+      </p:pic>
+      <p:pic>
+        <p:nvPicPr>
+          <p:cNvPr id="11" name="Picture 10" descr="ess_logo_transparent.png"/>
+          <p:cNvPicPr>
+            <a:picLocks noChangeAspect="1"/>
+          </p:cNvPicPr>
+          <p:nvPr/>
+        </p:nvPicPr>
+        <p:blipFill>
+          <a:blip r:embed="rId14">
+            <a:extLst>
+              <a:ext uri="{28A0092B-C50C-407E-A947-70E740481C1C}">
+                <a14:useLocalDpi xmlns:a14="http://schemas.microsoft.com/office/drawing/2010/main" val="0"/>
+              </a:ext>
+            </a:extLst>
+          </a:blip>
+          <a:stretch>
+            <a:fillRect/>
+          </a:stretch>
+        </p:blipFill>
+        <p:spPr>
+          <a:xfrm>
+            <a:off x="18644158" y="39395400"/>
+            <a:ext cx="4482855" cy="2382215"/>
+          </a:xfrm>
+          <a:prstGeom prst="rect">
+            <a:avLst/>
+          </a:prstGeom>
+        </p:spPr>
+      </p:pic>
+      <p:pic>
+        <p:nvPicPr>
+          <p:cNvPr id="2" name="Picture 1" descr="Ornl_hfir_sns_logo_vertical.png"/>
+          <p:cNvPicPr>
+            <a:picLocks noChangeAspect="1"/>
+          </p:cNvPicPr>
+          <p:nvPr/>
+        </p:nvPicPr>
+        <p:blipFill>
+          <a:blip r:embed="rId15" cstate="print">
+            <a:extLst>
+              <a:ext uri="{28A0092B-C50C-407E-A947-70E740481C1C}">
+                <a14:useLocalDpi xmlns:a14="http://schemas.microsoft.com/office/drawing/2010/main" val="0"/>
+              </a:ext>
+            </a:extLst>
+          </a:blip>
+          <a:stretch>
+            <a:fillRect/>
+          </a:stretch>
+        </p:blipFill>
+        <p:spPr>
+          <a:xfrm>
+            <a:off x="14399270" y="39619905"/>
+            <a:ext cx="3960440" cy="1957769"/>
+          </a:xfrm>
+          <a:prstGeom prst="rect">
+            <a:avLst/>
+          </a:prstGeom>
+        </p:spPr>
+      </p:pic>
+      <p:pic>
+        <p:nvPicPr>
+          <p:cNvPr id="6" name="Picture 5" descr="Mantid_Logo_with_icon.png"/>
+          <p:cNvPicPr>
+            <a:picLocks noChangeAspect="1"/>
+          </p:cNvPicPr>
+          <p:nvPr/>
+        </p:nvPicPr>
+        <p:blipFill>
+          <a:blip r:embed="rId16">
+            <a:extLst>
+              <a:ext uri="{28A0092B-C50C-407E-A947-70E740481C1C}">
+                <a14:useLocalDpi xmlns:a14="http://schemas.microsoft.com/office/drawing/2010/main" val="0"/>
+              </a:ext>
+            </a:extLst>
+          </a:blip>
+          <a:stretch>
+            <a:fillRect/>
+          </a:stretch>
+        </p:blipFill>
+        <p:spPr>
+          <a:xfrm>
+            <a:off x="861766" y="38899825"/>
+            <a:ext cx="5544616" cy="3085699"/>
+          </a:xfrm>
+          <a:prstGeom prst="rect">
+            <a:avLst/>
+          </a:prstGeom>
+        </p:spPr>
+      </p:pic>
     </p:spTree>
   </p:cSld>
   <p:clrMapOvr>
@@ -8965,7 +9026,7 @@
   <p:timing>
     <p:tnLst>
       <p:par>
-        <p:cTn id="1" dur="indefinite" restart="never" nodeType="tmRoot"/>
+        <p:cTn xmlns:p14="http://schemas.microsoft.com/office/powerpoint/2010/main" id="1" dur="indefinite" restart="never" nodeType="tmRoot"/>
       </p:par>
     </p:tnLst>
   </p:timing>

</xml_diff>

<commit_message>
Updated following Andrei's comments
</commit_message>
<xml_diff>
--- a/Presentations/ECNS 2015/SCDPoster.pptx
+++ b/Presentations/ECNS 2015/SCDPoster.pptx
@@ -3188,14 +3188,14 @@
           <p:nvPr>
             <p:extLst>
               <p:ext uri="{D42A27DB-BD31-4B8C-83A1-F6EECF244321}">
-                <p14:modId xmlns:p14="http://schemas.microsoft.com/office/powerpoint/2010/main" val="1893103062"/>
+                <p14:modId xmlns:p14="http://schemas.microsoft.com/office/powerpoint/2010/main" val="246369576"/>
               </p:ext>
             </p:extLst>
           </p:nvPr>
         </p:nvGraphicFramePr>
         <p:xfrm>
           <a:off x="1066800" y="9140097"/>
-          <a:ext cx="28194000" cy="35777452"/>
+          <a:ext cx="28194000" cy="35045932"/>
         </p:xfrm>
         <a:graphic>
           <a:graphicData uri="http://schemas.openxmlformats.org/drawingml/2006/table">
@@ -3277,7 +3277,31 @@
                           <a:ea typeface="+mn-ea"/>
                           <a:cs typeface="+mn-cs"/>
                         </a:rPr>
-                        <a:t>(TOF) sources, particularly for single crystal diffraction experiments. A full understanding of the materials of interest often requires the complete mapping of data in an n-dimensional manifold. Increasingly, and particularly in single crystal diffraction (SCD), the correct treatment of data as part of data reduction and analysis, for a range of techniques, involves the efficient and flexible processing of large n-dimensional datasets.</a:t>
+                        <a:t>(TOF) sources, particularly for single crystal diffraction </a:t>
+                      </a:r>
+                      <a:r>
+                        <a:rPr lang="en-GB" sz="2400" kern="1200" dirty="0" smtClean="0">
+                          <a:solidFill>
+                            <a:schemeClr val="tx1"/>
+                          </a:solidFill>
+                          <a:effectLst/>
+                          <a:latin typeface="+mn-lt"/>
+                          <a:ea typeface="+mn-ea"/>
+                          <a:cs typeface="+mn-cs"/>
+                        </a:rPr>
+                        <a:t>experiments. </a:t>
+                      </a:r>
+                      <a:r>
+                        <a:rPr lang="en-GB" sz="2400" kern="1200" dirty="0" smtClean="0">
+                          <a:solidFill>
+                            <a:schemeClr val="tx1"/>
+                          </a:solidFill>
+                          <a:effectLst/>
+                          <a:latin typeface="+mn-lt"/>
+                          <a:ea typeface="+mn-ea"/>
+                          <a:cs typeface="+mn-cs"/>
+                        </a:rPr>
+                        <a:t>Increasingly, and particularly in single crystal diffraction (SCD), the correct treatment of data as part of data reduction and analysis, for a range of techniques, involves the efficient and flexible processing of large n-dimensional datasets.</a:t>
                       </a:r>
                     </a:p>
                     <a:p>
@@ -3883,7 +3907,31 @@
                           <a:ea typeface="+mn-ea"/>
                           <a:cs typeface="+mn-cs"/>
                         </a:rPr>
-                        <a:t> stores it’s data in structures known as Workspaces.</a:t>
+                        <a:t> stores </a:t>
+                      </a:r>
+                      <a:r>
+                        <a:rPr lang="en-GB" sz="2400" b="0" i="0" kern="1200" dirty="0" smtClean="0">
+                          <a:solidFill>
+                            <a:schemeClr val="tx1"/>
+                          </a:solidFill>
+                          <a:effectLst/>
+                          <a:latin typeface="+mn-lt"/>
+                          <a:ea typeface="+mn-ea"/>
+                          <a:cs typeface="+mn-cs"/>
+                        </a:rPr>
+                        <a:t>its </a:t>
+                      </a:r>
+                      <a:r>
+                        <a:rPr lang="en-GB" sz="2400" b="0" i="0" kern="1200" dirty="0" smtClean="0">
+                          <a:solidFill>
+                            <a:schemeClr val="tx1"/>
+                          </a:solidFill>
+                          <a:effectLst/>
+                          <a:latin typeface="+mn-lt"/>
+                          <a:ea typeface="+mn-ea"/>
+                          <a:cs typeface="+mn-cs"/>
+                        </a:rPr>
+                        <a:t>data in structures known as Workspaces.</a:t>
                       </a:r>
                       <a:r>
                         <a:rPr lang="en-GB" sz="2400" b="0" i="0" kern="1200" baseline="0" dirty="0" smtClean="0">
@@ -4938,7 +4986,42 @@
                           <a:ea typeface="+mn-ea"/>
                           <a:cs typeface="+mn-cs"/>
                         </a:rPr>
-                        <a:t>A key hurdle is the ability to identify peaks, which we can do automatically. We use a hierarchical, recursive data structure, to store our n-dimensional data, which is particularly effective, as it gives higher resolution in the regions of the Bragg peaks at an overall low memory cost. </a:t>
+                        <a:t>A key hurdle is the ability to identify peaks, which we can do automatically. </a:t>
+                      </a:r>
+                      <a:r>
+                        <a:rPr lang="en-US" sz="2400" b="0" i="0" kern="1200" dirty="0" smtClean="0">
+                          <a:solidFill>
+                            <a:schemeClr val="tx1"/>
+                          </a:solidFill>
+                          <a:latin typeface="+mn-lt"/>
+                          <a:ea typeface="+mn-ea"/>
+                          <a:cs typeface="+mn-cs"/>
+                        </a:rPr>
+                        <a:t>The hierarchical, recursive data structure that we use to store our n-dimensional data is particularly effective</a:t>
+                      </a:r>
+                      <a:r>
+                        <a:rPr lang="en-GB" sz="2400" b="0" i="0" kern="1200" dirty="0" smtClean="0">
+                          <a:solidFill>
+                            <a:schemeClr val="tx1"/>
+                          </a:solidFill>
+                          <a:effectLst/>
+                          <a:latin typeface="+mn-lt"/>
+                          <a:ea typeface="+mn-ea"/>
+                          <a:cs typeface="+mn-cs"/>
+                        </a:rPr>
+                        <a:t>, </a:t>
+                      </a:r>
+                      <a:r>
+                        <a:rPr lang="en-GB" sz="2400" b="0" i="0" kern="1200" dirty="0" smtClean="0">
+                          <a:solidFill>
+                            <a:schemeClr val="tx1"/>
+                          </a:solidFill>
+                          <a:effectLst/>
+                          <a:latin typeface="+mn-lt"/>
+                          <a:ea typeface="+mn-ea"/>
+                          <a:cs typeface="+mn-cs"/>
+                        </a:rPr>
+                        <a:t>as it gives higher resolution in the regions of the Bragg peaks at an overall low memory cost. </a:t>
                       </a:r>
                     </a:p>
                     <a:p>
@@ -5734,7 +5817,37 @@
                           <a:ea typeface="+mn-ea"/>
                           <a:cs typeface="Symbol" charset="2"/>
                         </a:rPr>
-                        <a:t>. correctly normalizing and summing data from multiple experimental means tracking and separating the counts separately from the flux and solid angle contributions from each detector. Our solution is to calculate and sum the flux and solid angle contributions to each bin in reciprocal space across all scans, which we designate our normalization workspace. The counts for each run can then be summed and divided by our normalization workspace. The process of generating the normalization workspace can be expensive as we need to calculate the integrated flux between two wave vectors for every trajectory passing through a bin in our reciprocal data space. We have applied optimizations to the algorithms to improve speed and reduce memory. Our computed normalization workspace also acts as a planning tool, and we can use it to design experiments prior to beam time.</a:t>
+                        <a:t>. </a:t>
+                      </a:r>
+                      <a:r>
+                        <a:rPr kumimoji="0" lang="en-US" sz="2400" b="0" i="0" u="none" strike="noStrike" kern="0" cap="none" normalizeH="0" baseline="0" dirty="0" smtClean="0">
+                          <a:ln>
+                            <a:noFill/>
+                          </a:ln>
+                          <a:solidFill>
+                            <a:srgbClr val="000000"/>
+                          </a:solidFill>
+                          <a:effectLst/>
+                          <a:latin typeface="+mn-lt"/>
+                          <a:ea typeface="+mn-ea"/>
+                          <a:cs typeface="Symbol" charset="2"/>
+                        </a:rPr>
+                        <a:t>Correctly </a:t>
+                      </a:r>
+                      <a:r>
+                        <a:rPr kumimoji="0" lang="en-US" sz="2400" b="0" i="0" u="none" strike="noStrike" kern="0" cap="none" normalizeH="0" baseline="0" dirty="0" smtClean="0">
+                          <a:ln>
+                            <a:noFill/>
+                          </a:ln>
+                          <a:solidFill>
+                            <a:srgbClr val="000000"/>
+                          </a:solidFill>
+                          <a:effectLst/>
+                          <a:latin typeface="+mn-lt"/>
+                          <a:ea typeface="+mn-ea"/>
+                          <a:cs typeface="Symbol" charset="2"/>
+                        </a:rPr>
+                        <a:t>normalizing and summing data from multiple experimental means tracking and separating the counts separately from the flux and solid angle contributions from each detector. Our solution is to calculate and sum the flux and solid angle contributions to each bin in reciprocal space across all scans, which we designate our normalization workspace. The counts for each run can then be summed and divided by our normalization workspace. The process of generating the normalization workspace can be expensive as we need to calculate the integrated flux between two wave vectors for every trajectory passing through a bin in our reciprocal data space. We have applied optimizations to the algorithms to improve speed and reduce memory. Our computed normalization workspace also acts as a planning tool, and we can use it to design experiments prior to beam time.</a:t>
                       </a:r>
                     </a:p>
                     <a:p>
@@ -6954,55 +7067,8 @@
                           <a:ea typeface="+mn-ea"/>
                           <a:cs typeface="Arial"/>
                         </a:rPr>
-                        <a:t> is actively being developed.  Frequent meetings with instrument scientists continue to provide a steady stream of additional requirements and challenges. </a:t>
-                      </a:r>
-                    </a:p>
-                    <a:p>
-                      <a:pPr marL="0" marR="0" lvl="0" indent="0" algn="l" defTabSz="914400" rtl="0" eaLnBrk="1" fontAlgn="auto" latinLnBrk="0" hangingPunct="1">
-                        <a:lnSpc>
-                          <a:spcPct val="100000"/>
-                        </a:lnSpc>
-                        <a:spcBef>
-                          <a:spcPts val="0"/>
-                        </a:spcBef>
-                        <a:spcAft>
-                          <a:spcPts val="0"/>
-                        </a:spcAft>
-                        <a:buClrTx/>
-                        <a:buSzTx/>
-                        <a:buFontTx/>
-                        <a:buNone/>
-                        <a:tabLst/>
-                        <a:defRPr/>
-                      </a:pPr>
-                      <a:endParaRPr lang="en-GB" sz="2400" b="0" i="0" kern="1200" dirty="0" smtClean="0">
-                        <a:solidFill>
-                          <a:schemeClr val="tx1"/>
-                        </a:solidFill>
-                        <a:effectLst/>
-                        <a:latin typeface="+mn-lt"/>
-                        <a:ea typeface="+mn-ea"/>
-                        <a:cs typeface="+mn-cs"/>
-                      </a:endParaRPr>
-                    </a:p>
-                    <a:p>
-                      <a:pPr marL="0" marR="0" lvl="0" indent="0" algn="l" defTabSz="914400" rtl="0" eaLnBrk="1" fontAlgn="auto" latinLnBrk="0" hangingPunct="1">
-                        <a:lnSpc>
-                          <a:spcPct val="100000"/>
-                        </a:lnSpc>
-                        <a:spcBef>
-                          <a:spcPts val="0"/>
-                        </a:spcBef>
-                        <a:spcAft>
-                          <a:spcPts val="0"/>
-                        </a:spcAft>
-                        <a:buClrTx/>
-                        <a:buSzTx/>
-                        <a:buFontTx/>
-                        <a:buNone/>
-                        <a:tabLst/>
-                        <a:defRPr/>
-                      </a:pPr>
+                        <a:t> is actively being developed.  Frequent meetings with instrument scientists continue to provide a steady stream of additional requirements and challenges</a:t>
+                      </a:r>
                       <a:r>
                         <a:rPr lang="en-GB" sz="2400" b="0" i="0" kern="1200" dirty="0" smtClean="0">
                           <a:solidFill>
@@ -7011,89 +7077,12 @@
                           <a:effectLst/>
                           <a:latin typeface="+mn-lt"/>
                           <a:ea typeface="+mn-ea"/>
-                          <a:cs typeface="+mn-cs"/>
-                        </a:rPr>
-                        <a:t>A large number of </a:t>
-                      </a:r>
-                      <a:r>
-                        <a:rPr lang="en-GB" sz="2400" b="0" i="0" kern="1200" dirty="0" err="1" smtClean="0">
-                          <a:solidFill>
-                            <a:schemeClr val="tx1"/>
-                          </a:solidFill>
-                          <a:effectLst/>
-                          <a:latin typeface="+mn-lt"/>
-                          <a:ea typeface="+mn-ea"/>
-                          <a:cs typeface="+mn-cs"/>
-                        </a:rPr>
-                        <a:t>Mantid’s</a:t>
-                      </a:r>
-                      <a:r>
-                        <a:rPr lang="en-GB" sz="2400" b="0" i="0" kern="1200" dirty="0" smtClean="0">
-                          <a:solidFill>
-                            <a:schemeClr val="tx1"/>
-                          </a:solidFill>
-                          <a:effectLst/>
-                          <a:latin typeface="+mn-lt"/>
-                          <a:ea typeface="+mn-ea"/>
-                          <a:cs typeface="+mn-cs"/>
-                        </a:rPr>
-                        <a:t> current SCD</a:t>
-                      </a:r>
-                      <a:r>
-                        <a:rPr lang="en-GB" sz="2400" b="0" i="0" kern="1200" baseline="0" dirty="0" smtClean="0">
-                          <a:solidFill>
-                            <a:schemeClr val="tx1"/>
-                          </a:solidFill>
-                          <a:effectLst/>
-                          <a:latin typeface="+mn-lt"/>
-                          <a:ea typeface="+mn-ea"/>
-                          <a:cs typeface="+mn-cs"/>
-                        </a:rPr>
-                        <a:t> suite is based on computations in reciprocal space. However, </a:t>
-                      </a:r>
-                      <a:r>
-                        <a:rPr lang="en-GB" sz="2400" b="0" i="0" kern="1200" baseline="0" dirty="0" err="1" smtClean="0">
-                          <a:solidFill>
-                            <a:schemeClr val="tx1"/>
-                          </a:solidFill>
-                          <a:effectLst/>
-                          <a:latin typeface="+mn-lt"/>
-                          <a:ea typeface="+mn-ea"/>
-                          <a:cs typeface="+mn-cs"/>
-                        </a:rPr>
-                        <a:t>Mantid</a:t>
-                      </a:r>
-                      <a:r>
-                        <a:rPr lang="en-GB" sz="2400" b="0" i="0" kern="1200" baseline="0" dirty="0" smtClean="0">
-                          <a:solidFill>
-                            <a:schemeClr val="tx1"/>
-                          </a:solidFill>
-                          <a:effectLst/>
-                          <a:latin typeface="+mn-lt"/>
-                          <a:ea typeface="+mn-ea"/>
-                          <a:cs typeface="+mn-cs"/>
-                        </a:rPr>
-                        <a:t> does not inherently assume either dimensionality or units for it’s data. We can therefore easily extend the suite to include other methods. We intended to do so to incorporate other proven peak integration routines.</a:t>
-                      </a:r>
-                    </a:p>
-                    <a:p>
-                      <a:pPr marL="0" marR="0" lvl="0" indent="0" algn="l" defTabSz="914400" rtl="0" eaLnBrk="1" fontAlgn="auto" latinLnBrk="0" hangingPunct="1">
-                        <a:lnSpc>
-                          <a:spcPct val="100000"/>
-                        </a:lnSpc>
-                        <a:spcBef>
-                          <a:spcPts val="0"/>
-                        </a:spcBef>
-                        <a:spcAft>
-                          <a:spcPts val="0"/>
-                        </a:spcAft>
-                        <a:buClrTx/>
-                        <a:buSzTx/>
-                        <a:buFontTx/>
-                        <a:buNone/>
-                        <a:tabLst/>
-                        <a:defRPr/>
-                      </a:pPr>
+                          <a:cs typeface="Arial"/>
+                        </a:rPr>
+                        <a:t>.</a:t>
+                      </a:r>
+                    </a:p>
+                    <a:p>
                       <a:endParaRPr lang="en-GB" sz="2400" b="0" i="0" kern="1200" baseline="0" dirty="0" smtClean="0">
                         <a:solidFill>
                           <a:schemeClr val="tx1"/>
@@ -7105,23 +7094,6 @@
                       </a:endParaRPr>
                     </a:p>
                     <a:p>
-                      <a:pPr marL="0" marR="0" lvl="0" indent="0" algn="l" defTabSz="914400" rtl="0" eaLnBrk="1" fontAlgn="auto" latinLnBrk="0" hangingPunct="1">
-                        <a:lnSpc>
-                          <a:spcPct val="100000"/>
-                        </a:lnSpc>
-                        <a:spcBef>
-                          <a:spcPts val="0"/>
-                        </a:spcBef>
-                        <a:spcAft>
-                          <a:spcPts val="0"/>
-                        </a:spcAft>
-                        <a:buClrTx/>
-                        <a:buSzTx/>
-                        <a:buFontTx/>
-                        <a:buNone/>
-                        <a:tabLst/>
-                        <a:defRPr/>
-                      </a:pPr>
                       <a:r>
                         <a:rPr lang="en-GB" sz="2400" b="0" i="0" kern="1200" baseline="0" dirty="0" smtClean="0">
                           <a:solidFill>
@@ -7132,7 +7104,67 @@
                           <a:ea typeface="+mn-ea"/>
                           <a:cs typeface="+mn-cs"/>
                         </a:rPr>
-                        <a:t>New developments in hardware lead to higher data rates. The introduction of the ESS into the collaboration will yield challenges to our existing methodologies.</a:t>
+                        <a:t>New </a:t>
+                      </a:r>
+                      <a:r>
+                        <a:rPr lang="en-GB" sz="2400" b="0" i="0" kern="1200" baseline="0" dirty="0" smtClean="0">
+                          <a:solidFill>
+                            <a:schemeClr val="tx1"/>
+                          </a:solidFill>
+                          <a:effectLst/>
+                          <a:latin typeface="+mn-lt"/>
+                          <a:ea typeface="+mn-ea"/>
+                          <a:cs typeface="+mn-cs"/>
+                        </a:rPr>
+                        <a:t>developments in hardware </a:t>
+                      </a:r>
+                      <a:r>
+                        <a:rPr lang="en-GB" sz="2400" b="0" i="0" kern="1200" baseline="0" dirty="0" smtClean="0">
+                          <a:solidFill>
+                            <a:schemeClr val="tx1"/>
+                          </a:solidFill>
+                          <a:effectLst/>
+                          <a:latin typeface="+mn-lt"/>
+                          <a:ea typeface="+mn-ea"/>
+                          <a:cs typeface="+mn-cs"/>
+                        </a:rPr>
+                        <a:t>continually lead </a:t>
+                      </a:r>
+                      <a:r>
+                        <a:rPr lang="en-GB" sz="2400" b="0" i="0" kern="1200" baseline="0" dirty="0" smtClean="0">
+                          <a:solidFill>
+                            <a:schemeClr val="tx1"/>
+                          </a:solidFill>
+                          <a:effectLst/>
+                          <a:latin typeface="+mn-lt"/>
+                          <a:ea typeface="+mn-ea"/>
+                          <a:cs typeface="+mn-cs"/>
+                        </a:rPr>
+                        <a:t>to higher data rates. The introduction of the ESS into the collaboration will </a:t>
+                      </a:r>
+                      <a:r>
+                        <a:rPr lang="en-GB" sz="2400" b="0" i="0" kern="1200" baseline="0" dirty="0" smtClean="0">
+                          <a:solidFill>
+                            <a:schemeClr val="tx1"/>
+                          </a:solidFill>
+                          <a:effectLst/>
+                          <a:latin typeface="+mn-lt"/>
+                          <a:ea typeface="+mn-ea"/>
+                          <a:cs typeface="+mn-cs"/>
+                        </a:rPr>
+                        <a:t>push further our </a:t>
+                      </a:r>
+                      <a:r>
+                        <a:rPr lang="en-GB" sz="2400" b="0" i="0" kern="1200" baseline="0" dirty="0" smtClean="0">
+                          <a:solidFill>
+                            <a:schemeClr val="tx1"/>
+                          </a:solidFill>
+                          <a:effectLst/>
+                          <a:latin typeface="+mn-lt"/>
+                          <a:ea typeface="+mn-ea"/>
+                          <a:cs typeface="+mn-cs"/>
+                        </a:rPr>
+                        <a:t>existing methodologies.</a:t>
                       </a:r>
                     </a:p>
                     <a:p>
@@ -7181,55 +7213,107 @@
                         <a:t>[1] </a:t>
                       </a:r>
                       <a:r>
-                        <a:rPr lang="en-GB" sz="1800" u="sng" kern="1200" dirty="0" smtClean="0">
-                          <a:solidFill>
-                            <a:schemeClr val="tx1"/>
-                          </a:solidFill>
-                          <a:effectLst/>
-                          <a:latin typeface="Arial"/>
-                          <a:ea typeface="+mn-ea"/>
-                          <a:cs typeface="Arial"/>
-                          <a:hlinkClick r:id="rId3"/>
-                        </a:rPr>
-                        <a:t>www.mantidroject.org</a:t>
-                      </a:r>
+                        <a:rPr lang="en-US" sz="1800" kern="1200" dirty="0" smtClean="0">
+                          <a:solidFill>
+                            <a:schemeClr val="tx1"/>
+                          </a:solidFill>
+                          <a:latin typeface="+mn-lt"/>
+                          <a:ea typeface="+mn-ea"/>
+                          <a:cs typeface="+mn-cs"/>
+                        </a:rPr>
+                        <a:t>Taylor, J., Arnold, O., </a:t>
+                      </a:r>
+                      <a:r>
+                        <a:rPr lang="en-US" sz="1800" kern="1200" dirty="0" err="1" smtClean="0">
+                          <a:solidFill>
+                            <a:schemeClr val="tx1"/>
+                          </a:solidFill>
+                          <a:latin typeface="+mn-lt"/>
+                          <a:ea typeface="+mn-ea"/>
+                          <a:cs typeface="+mn-cs"/>
+                        </a:rPr>
+                        <a:t>Bilheaux</a:t>
+                      </a:r>
+                      <a:r>
+                        <a:rPr lang="en-US" sz="1800" kern="1200" dirty="0" smtClean="0">
+                          <a:solidFill>
+                            <a:schemeClr val="tx1"/>
+                          </a:solidFill>
+                          <a:latin typeface="+mn-lt"/>
+                          <a:ea typeface="+mn-ea"/>
+                          <a:cs typeface="+mn-cs"/>
+                        </a:rPr>
+                        <a:t>, J., Buts, A., Campbell, S., </a:t>
+                      </a:r>
+                      <a:r>
+                        <a:rPr lang="en-US" sz="1800" kern="1200" dirty="0" err="1" smtClean="0">
+                          <a:solidFill>
+                            <a:schemeClr val="tx1"/>
+                          </a:solidFill>
+                          <a:latin typeface="+mn-lt"/>
+                          <a:ea typeface="+mn-ea"/>
+                          <a:cs typeface="+mn-cs"/>
+                        </a:rPr>
+                        <a:t>Doucet</a:t>
+                      </a:r>
+                      <a:r>
+                        <a:rPr lang="en-US" sz="1800" kern="1200" dirty="0" smtClean="0">
+                          <a:solidFill>
+                            <a:schemeClr val="tx1"/>
+                          </a:solidFill>
+                          <a:latin typeface="+mn-lt"/>
+                          <a:ea typeface="+mn-ea"/>
+                          <a:cs typeface="+mn-cs"/>
+                        </a:rPr>
+                        <a:t>, M., ... &amp; </a:t>
+                      </a:r>
+                      <a:r>
+                        <a:rPr lang="en-US" sz="1800" kern="1200" dirty="0" err="1" smtClean="0">
+                          <a:solidFill>
+                            <a:schemeClr val="tx1"/>
+                          </a:solidFill>
+                          <a:latin typeface="+mn-lt"/>
+                          <a:ea typeface="+mn-ea"/>
+                          <a:cs typeface="+mn-cs"/>
+                        </a:rPr>
+                        <a:t>Zikovsky</a:t>
+                      </a:r>
+                      <a:r>
+                        <a:rPr lang="en-US" sz="1800" kern="1200" dirty="0" smtClean="0">
+                          <a:solidFill>
+                            <a:schemeClr val="tx1"/>
+                          </a:solidFill>
+                          <a:latin typeface="+mn-lt"/>
+                          <a:ea typeface="+mn-ea"/>
+                          <a:cs typeface="+mn-cs"/>
+                        </a:rPr>
+                        <a:t>, J. (2012). </a:t>
+                      </a:r>
+                      <a:r>
+                        <a:rPr lang="en-US" sz="1800" kern="1200" dirty="0" err="1" smtClean="0">
+                          <a:solidFill>
+                            <a:schemeClr val="tx1"/>
+                          </a:solidFill>
+                          <a:latin typeface="+mn-lt"/>
+                          <a:ea typeface="+mn-ea"/>
+                          <a:cs typeface="+mn-cs"/>
+                        </a:rPr>
+                        <a:t>Mantid</a:t>
+                      </a:r>
+                      <a:r>
+                        <a:rPr lang="en-US" sz="1800" kern="1200" dirty="0" smtClean="0">
+                          <a:solidFill>
+                            <a:schemeClr val="tx1"/>
+                          </a:solidFill>
+                          <a:latin typeface="+mn-lt"/>
+                          <a:ea typeface="+mn-ea"/>
+                          <a:cs typeface="+mn-cs"/>
+                        </a:rPr>
+                        <a:t>, A high performance framework for reduction and analysis of neutron scattering data. Bulletin of the American Physical Society, 57.</a:t>
+                      </a:r>
+                    </a:p>
+                    <a:p>
                       <a:endParaRPr lang="en-GB" sz="1800" kern="1200" dirty="0" smtClean="0">
-                        <a:solidFill>
-                          <a:schemeClr val="tx1"/>
-                        </a:solidFill>
-                        <a:effectLst/>
-                        <a:latin typeface="Arial"/>
-                        <a:ea typeface="+mn-ea"/>
-                        <a:cs typeface="Arial"/>
-                      </a:endParaRPr>
-                    </a:p>
-                    <a:p>
-                      <a:r>
-                        <a:rPr lang="en-GB" sz="1800" kern="1200" dirty="0" smtClean="0">
-                          <a:solidFill>
-                            <a:schemeClr val="tx1"/>
-                          </a:solidFill>
-                          <a:effectLst/>
-                          <a:latin typeface="Arial"/>
-                          <a:ea typeface="+mn-ea"/>
-                          <a:cs typeface="Arial"/>
-                        </a:rPr>
-                        <a:t>[2] </a:t>
-                      </a:r>
-                      <a:r>
-                        <a:rPr lang="en-GB" sz="1800" u="sng" kern="1200" dirty="0" smtClean="0">
-                          <a:solidFill>
-                            <a:schemeClr val="tx1"/>
-                          </a:solidFill>
-                          <a:effectLst/>
-                          <a:latin typeface="Arial"/>
-                          <a:ea typeface="+mn-ea"/>
-                          <a:cs typeface="Arial"/>
-                          <a:hlinkClick r:id="rId4"/>
-                        </a:rPr>
-                        <a:t>www.paraview.org</a:t>
-                      </a:r>
-                      <a:endParaRPr lang="en-GB" sz="1800" u="sng" kern="1200" dirty="0" smtClean="0">
                         <a:solidFill>
                           <a:schemeClr val="tx1"/>
                         </a:solidFill>
@@ -7267,7 +7351,172 @@
                           <a:ea typeface="+mn-ea"/>
                           <a:cs typeface="Arial"/>
                         </a:rPr>
-                        <a:t>[3] </a:t>
+                        <a:t>[</a:t>
+                      </a:r>
+                      <a:r>
+                        <a:rPr lang="en-GB" sz="1800" kern="1200" dirty="0" smtClean="0">
+                          <a:solidFill>
+                            <a:schemeClr val="tx1"/>
+                          </a:solidFill>
+                          <a:effectLst/>
+                          <a:latin typeface="Arial"/>
+                          <a:ea typeface="+mn-ea"/>
+                          <a:cs typeface="Arial"/>
+                        </a:rPr>
+                        <a:t>2</a:t>
+                      </a:r>
+                      <a:r>
+                        <a:rPr lang="en-GB" sz="1800" kern="1200" dirty="0" smtClean="0">
+                          <a:solidFill>
+                            <a:schemeClr val="tx1"/>
+                          </a:solidFill>
+                          <a:effectLst/>
+                          <a:latin typeface="Arial"/>
+                          <a:ea typeface="+mn-ea"/>
+                          <a:cs typeface="Arial"/>
+                        </a:rPr>
+                        <a:t>]</a:t>
+                      </a:r>
+                      <a:r>
+                        <a:rPr lang="en-US" sz="1800" kern="1200" dirty="0" smtClean="0">
+                          <a:solidFill>
+                            <a:schemeClr val="tx1"/>
+                          </a:solidFill>
+                          <a:latin typeface="+mn-lt"/>
+                          <a:ea typeface="+mn-ea"/>
+                          <a:cs typeface="+mn-cs"/>
+                        </a:rPr>
+                        <a:t> Ahrens, James, </a:t>
+                      </a:r>
+                      <a:r>
+                        <a:rPr lang="en-US" sz="1800" kern="1200" dirty="0" err="1" smtClean="0">
+                          <a:solidFill>
+                            <a:schemeClr val="tx1"/>
+                          </a:solidFill>
+                          <a:latin typeface="+mn-lt"/>
+                          <a:ea typeface="+mn-ea"/>
+                          <a:cs typeface="+mn-cs"/>
+                        </a:rPr>
+                        <a:t>Geveci</a:t>
+                      </a:r>
+                      <a:r>
+                        <a:rPr lang="en-US" sz="1800" kern="1200" dirty="0" smtClean="0">
+                          <a:solidFill>
+                            <a:schemeClr val="tx1"/>
+                          </a:solidFill>
+                          <a:latin typeface="+mn-lt"/>
+                          <a:ea typeface="+mn-ea"/>
+                          <a:cs typeface="+mn-cs"/>
+                        </a:rPr>
+                        <a:t>, </a:t>
+                      </a:r>
+                      <a:r>
+                        <a:rPr lang="en-US" sz="1800" kern="1200" dirty="0" err="1" smtClean="0">
+                          <a:solidFill>
+                            <a:schemeClr val="tx1"/>
+                          </a:solidFill>
+                          <a:latin typeface="+mn-lt"/>
+                          <a:ea typeface="+mn-ea"/>
+                          <a:cs typeface="+mn-cs"/>
+                        </a:rPr>
+                        <a:t>Berk</a:t>
+                      </a:r>
+                      <a:r>
+                        <a:rPr lang="en-US" sz="1800" kern="1200" dirty="0" smtClean="0">
+                          <a:solidFill>
+                            <a:schemeClr val="tx1"/>
+                          </a:solidFill>
+                          <a:latin typeface="+mn-lt"/>
+                          <a:ea typeface="+mn-ea"/>
+                          <a:cs typeface="+mn-cs"/>
+                        </a:rPr>
+                        <a:t>, Law, Charles, </a:t>
+                      </a:r>
+                      <a:r>
+                        <a:rPr lang="en-US" sz="1800" i="1" kern="1200" dirty="0" err="1" smtClean="0">
+                          <a:solidFill>
+                            <a:schemeClr val="tx1"/>
+                          </a:solidFill>
+                          <a:latin typeface="+mn-lt"/>
+                          <a:ea typeface="+mn-ea"/>
+                          <a:cs typeface="+mn-cs"/>
+                        </a:rPr>
+                        <a:t>ParaView</a:t>
+                      </a:r>
+                      <a:r>
+                        <a:rPr lang="en-US" sz="1800" i="1" kern="1200" dirty="0" smtClean="0">
+                          <a:solidFill>
+                            <a:schemeClr val="tx1"/>
+                          </a:solidFill>
+                          <a:latin typeface="+mn-lt"/>
+                          <a:ea typeface="+mn-ea"/>
+                          <a:cs typeface="+mn-cs"/>
+                        </a:rPr>
+                        <a:t>: An End-User Tool for Large Data Visualization</a:t>
+                      </a:r>
+                      <a:r>
+                        <a:rPr lang="en-US" sz="1800" i="0" kern="1200" dirty="0" smtClean="0">
+                          <a:solidFill>
+                            <a:schemeClr val="tx1"/>
+                          </a:solidFill>
+                          <a:latin typeface="+mn-lt"/>
+                          <a:ea typeface="+mn-ea"/>
+                          <a:cs typeface="+mn-cs"/>
+                        </a:rPr>
+                        <a:t>, Visualization Handbook, Elsevier, 2005, ISBN-13: 978-0123875822</a:t>
+                      </a:r>
+                    </a:p>
+                    <a:p>
+                      <a:pPr marL="0" marR="0" indent="0" algn="l" defTabSz="914400" rtl="0" eaLnBrk="1" fontAlgn="auto" latinLnBrk="0" hangingPunct="1">
+                        <a:lnSpc>
+                          <a:spcPct val="100000"/>
+                        </a:lnSpc>
+                        <a:spcBef>
+                          <a:spcPts val="0"/>
+                        </a:spcBef>
+                        <a:spcAft>
+                          <a:spcPts val="0"/>
+                        </a:spcAft>
+                        <a:buClrTx/>
+                        <a:buSzTx/>
+                        <a:buFontTx/>
+                        <a:buNone/>
+                        <a:tabLst/>
+                        <a:defRPr/>
+                      </a:pPr>
+                      <a:endParaRPr lang="en-US" sz="1800" i="0" kern="1200" dirty="0" smtClean="0">
+                        <a:solidFill>
+                          <a:schemeClr val="tx1"/>
+                        </a:solidFill>
+                        <a:latin typeface="+mn-lt"/>
+                        <a:ea typeface="+mn-ea"/>
+                        <a:cs typeface="+mn-cs"/>
+                      </a:endParaRPr>
+                    </a:p>
+                    <a:p>
+                      <a:r>
+                        <a:rPr lang="en-GB" sz="1800" kern="1200" dirty="0" smtClean="0">
+                          <a:solidFill>
+                            <a:schemeClr val="tx1"/>
+                          </a:solidFill>
+                          <a:effectLst/>
+                          <a:latin typeface="Arial"/>
+                          <a:ea typeface="+mn-ea"/>
+                          <a:cs typeface="Arial"/>
+                        </a:rPr>
+                        <a:t>[</a:t>
+                      </a:r>
+                      <a:r>
+                        <a:rPr lang="en-GB" sz="1800" kern="1200" dirty="0" smtClean="0">
+                          <a:solidFill>
+                            <a:schemeClr val="tx1"/>
+                          </a:solidFill>
+                          <a:effectLst/>
+                          <a:latin typeface="Arial"/>
+                          <a:ea typeface="+mn-ea"/>
+                          <a:cs typeface="Arial"/>
+                        </a:rPr>
+                        <a:t>3] </a:t>
                       </a:r>
                       <a:r>
                         <a:rPr lang="en-US" sz="1800" kern="1200" dirty="0" err="1" smtClean="0">
@@ -8320,7 +8569,7 @@
             <p:nvPr/>
           </p:nvPicPr>
           <p:blipFill>
-            <a:blip r:embed="rId5">
+            <a:blip r:embed="rId3">
               <a:extLst>
                 <a:ext uri="{28A0092B-C50C-407E-A947-70E740481C1C}">
                   <a14:useLocalDpi xmlns:a14="http://schemas.microsoft.com/office/drawing/2010/main" val="0"/>
@@ -8350,7 +8599,7 @@
         </p:nvGrpSpPr>
         <p:grpSpPr>
           <a:xfrm>
-            <a:off x="861766" y="31410993"/>
+            <a:off x="861766" y="30474889"/>
             <a:ext cx="9144000" cy="6345996"/>
             <a:chOff x="861766" y="29754809"/>
             <a:chExt cx="9144000" cy="6345996"/>
@@ -8365,7 +8614,7 @@
             <p:nvPr/>
           </p:nvPicPr>
           <p:blipFill>
-            <a:blip r:embed="rId6"/>
+            <a:blip r:embed="rId4"/>
             <a:stretch>
               <a:fillRect/>
             </a:stretch>
@@ -8438,7 +8687,7 @@
             <p:nvPr/>
           </p:nvPicPr>
           <p:blipFill>
-            <a:blip r:embed="rId7"/>
+            <a:blip r:embed="rId5"/>
             <a:stretch>
               <a:fillRect/>
             </a:stretch>
@@ -8517,7 +8766,7 @@
             <p:nvPr/>
           </p:nvPicPr>
           <p:blipFill>
-            <a:blip r:embed="rId8" cstate="print">
+            <a:blip r:embed="rId6" cstate="print">
               <a:extLst>
                 <a:ext uri="{28A0092B-C50C-407E-A947-70E740481C1C}">
                   <a14:useLocalDpi xmlns:a14="http://schemas.microsoft.com/office/drawing/2010/main" val="0"/>
@@ -8547,7 +8796,7 @@
             <p:nvPr/>
           </p:nvPicPr>
           <p:blipFill>
-            <a:blip r:embed="rId9">
+            <a:blip r:embed="rId7">
               <a:extLst>
                 <a:ext uri="{28A0092B-C50C-407E-A947-70E740481C1C}">
                   <a14:useLocalDpi xmlns:a14="http://schemas.microsoft.com/office/drawing/2010/main" val="0"/>
@@ -8713,7 +8962,7 @@
             <p:nvPr/>
           </p:nvPicPr>
           <p:blipFill>
-            <a:blip r:embed="rId10"/>
+            <a:blip r:embed="rId8"/>
             <a:stretch>
               <a:fillRect/>
             </a:stretch>
@@ -8798,7 +9047,7 @@
             <p:nvPr/>
           </p:nvPicPr>
           <p:blipFill>
-            <a:blip r:embed="rId11">
+            <a:blip r:embed="rId9">
               <a:extLst>
                 <a:ext uri="{28A0092B-C50C-407E-A947-70E740481C1C}">
                   <a14:useLocalDpi xmlns:a14="http://schemas.microsoft.com/office/drawing/2010/main" val="0"/>
@@ -8872,122 +9121,152 @@
           </p:txBody>
         </p:sp>
       </p:grpSp>
-      <p:pic>
-        <p:nvPicPr>
-          <p:cNvPr id="3089" name="Picture 17" descr="C:\Mantid\Documents\Images\ISIS Logo - Transparent.gif"/>
-          <p:cNvPicPr>
-            <a:picLocks noChangeAspect="1" noChangeArrowheads="1"/>
-          </p:cNvPicPr>
+      <p:grpSp>
+        <p:nvGrpSpPr>
+          <p:cNvPr id="15" name="Group 14"/>
+          <p:cNvGrpSpPr/>
           <p:nvPr/>
-        </p:nvPicPr>
-        <p:blipFill>
-          <a:blip r:embed="rId12" cstate="print"/>
-          <a:srcRect/>
-          <a:stretch>
-            <a:fillRect/>
-          </a:stretch>
-        </p:blipFill>
-        <p:spPr bwMode="auto">
+        </p:nvGrpSpPr>
+        <p:grpSpPr>
           <a:xfrm>
-            <a:off x="9877541" y="39755440"/>
-            <a:ext cx="4266451" cy="1888429"/>
+            <a:off x="9877541" y="39187857"/>
+            <a:ext cx="19586276" cy="2382215"/>
+            <a:chOff x="9877541" y="39475889"/>
+            <a:chExt cx="19586276" cy="2382215"/>
           </a:xfrm>
-          <a:prstGeom prst="rect">
-            <a:avLst/>
-          </a:prstGeom>
-          <a:noFill/>
-        </p:spPr>
-      </p:pic>
-      <p:pic>
-        <p:nvPicPr>
-          <p:cNvPr id="4" name="Picture 3" descr="Tessella_Logo.gif"/>
-          <p:cNvPicPr>
-            <a:picLocks noChangeAspect="1"/>
-          </p:cNvPicPr>
-          <p:nvPr/>
-        </p:nvPicPr>
-        <p:blipFill>
-          <a:blip r:embed="rId13">
-            <a:extLst>
-              <a:ext uri="{28A0092B-C50C-407E-A947-70E740481C1C}">
-                <a14:useLocalDpi xmlns:a14="http://schemas.microsoft.com/office/drawing/2010/main" val="0"/>
-              </a:ext>
-            </a:extLst>
-          </a:blip>
-          <a:stretch>
-            <a:fillRect/>
-          </a:stretch>
-        </p:blipFill>
-        <p:spPr>
-          <a:xfrm>
-            <a:off x="23559061" y="39395400"/>
-            <a:ext cx="5904756" cy="2363985"/>
-          </a:xfrm>
-          <a:prstGeom prst="rect">
-            <a:avLst/>
-          </a:prstGeom>
-        </p:spPr>
-      </p:pic>
-      <p:pic>
-        <p:nvPicPr>
-          <p:cNvPr id="11" name="Picture 10" descr="ess_logo_transparent.png"/>
-          <p:cNvPicPr>
-            <a:picLocks noChangeAspect="1"/>
-          </p:cNvPicPr>
-          <p:nvPr/>
-        </p:nvPicPr>
-        <p:blipFill>
-          <a:blip r:embed="rId14">
-            <a:extLst>
-              <a:ext uri="{28A0092B-C50C-407E-A947-70E740481C1C}">
-                <a14:useLocalDpi xmlns:a14="http://schemas.microsoft.com/office/drawing/2010/main" val="0"/>
-              </a:ext>
-            </a:extLst>
-          </a:blip>
-          <a:stretch>
-            <a:fillRect/>
-          </a:stretch>
-        </p:blipFill>
-        <p:spPr>
-          <a:xfrm>
-            <a:off x="18644158" y="39395400"/>
-            <a:ext cx="4482855" cy="2382215"/>
-          </a:xfrm>
-          <a:prstGeom prst="rect">
-            <a:avLst/>
-          </a:prstGeom>
-        </p:spPr>
-      </p:pic>
-      <p:pic>
-        <p:nvPicPr>
-          <p:cNvPr id="2" name="Picture 1" descr="Ornl_hfir_sns_logo_vertical.png"/>
-          <p:cNvPicPr>
-            <a:picLocks noChangeAspect="1"/>
-          </p:cNvPicPr>
-          <p:nvPr/>
-        </p:nvPicPr>
-        <p:blipFill>
-          <a:blip r:embed="rId15" cstate="print">
-            <a:extLst>
-              <a:ext uri="{28A0092B-C50C-407E-A947-70E740481C1C}">
-                <a14:useLocalDpi xmlns:a14="http://schemas.microsoft.com/office/drawing/2010/main" val="0"/>
-              </a:ext>
-            </a:extLst>
-          </a:blip>
-          <a:stretch>
-            <a:fillRect/>
-          </a:stretch>
-        </p:blipFill>
-        <p:spPr>
-          <a:xfrm>
-            <a:off x="14399270" y="39619905"/>
-            <a:ext cx="3960440" cy="1957769"/>
-          </a:xfrm>
-          <a:prstGeom prst="rect">
-            <a:avLst/>
-          </a:prstGeom>
-        </p:spPr>
-      </p:pic>
+        </p:grpSpPr>
+        <p:grpSp>
+          <p:nvGrpSpPr>
+            <p:cNvPr id="14" name="Group 13"/>
+            <p:cNvGrpSpPr/>
+            <p:nvPr/>
+          </p:nvGrpSpPr>
+          <p:grpSpPr>
+            <a:xfrm>
+              <a:off x="9877541" y="39475889"/>
+              <a:ext cx="19586276" cy="2382215"/>
+              <a:chOff x="9877541" y="39469938"/>
+              <a:chExt cx="19586276" cy="2382215"/>
+            </a:xfrm>
+          </p:grpSpPr>
+          <p:pic>
+            <p:nvPicPr>
+              <p:cNvPr id="3089" name="Picture 17" descr="C:\Mantid\Documents\Images\ISIS Logo - Transparent.gif"/>
+              <p:cNvPicPr>
+                <a:picLocks noChangeAspect="1" noChangeArrowheads="1"/>
+              </p:cNvPicPr>
+              <p:nvPr/>
+            </p:nvPicPr>
+            <p:blipFill>
+              <a:blip r:embed="rId10" cstate="print"/>
+              <a:srcRect/>
+              <a:stretch>
+                <a:fillRect/>
+              </a:stretch>
+            </p:blipFill>
+            <p:spPr bwMode="auto">
+              <a:xfrm>
+                <a:off x="9877541" y="39691913"/>
+                <a:ext cx="4266451" cy="1888429"/>
+              </a:xfrm>
+              <a:prstGeom prst="rect">
+                <a:avLst/>
+              </a:prstGeom>
+              <a:noFill/>
+            </p:spPr>
+          </p:pic>
+          <p:pic>
+            <p:nvPicPr>
+              <p:cNvPr id="4" name="Picture 3" descr="Tessella_Logo.gif"/>
+              <p:cNvPicPr>
+                <a:picLocks noChangeAspect="1"/>
+              </p:cNvPicPr>
+              <p:nvPr/>
+            </p:nvPicPr>
+            <p:blipFill>
+              <a:blip r:embed="rId11">
+                <a:extLst>
+                  <a:ext uri="{28A0092B-C50C-407E-A947-70E740481C1C}">
+                    <a14:useLocalDpi xmlns:a14="http://schemas.microsoft.com/office/drawing/2010/main" val="0"/>
+                  </a:ext>
+                </a:extLst>
+              </a:blip>
+              <a:stretch>
+                <a:fillRect/>
+              </a:stretch>
+            </p:blipFill>
+            <p:spPr>
+              <a:xfrm>
+                <a:off x="23559061" y="39469938"/>
+                <a:ext cx="5904756" cy="2363985"/>
+              </a:xfrm>
+              <a:prstGeom prst="rect">
+                <a:avLst/>
+              </a:prstGeom>
+            </p:spPr>
+          </p:pic>
+          <p:pic>
+            <p:nvPicPr>
+              <p:cNvPr id="11" name="Picture 10" descr="ess_logo_transparent.png"/>
+              <p:cNvPicPr>
+                <a:picLocks noChangeAspect="1"/>
+              </p:cNvPicPr>
+              <p:nvPr/>
+            </p:nvPicPr>
+            <p:blipFill>
+              <a:blip r:embed="rId12">
+                <a:extLst>
+                  <a:ext uri="{28A0092B-C50C-407E-A947-70E740481C1C}">
+                    <a14:useLocalDpi xmlns:a14="http://schemas.microsoft.com/office/drawing/2010/main" val="0"/>
+                  </a:ext>
+                </a:extLst>
+              </a:blip>
+              <a:stretch>
+                <a:fillRect/>
+              </a:stretch>
+            </p:blipFill>
+            <p:spPr>
+              <a:xfrm>
+                <a:off x="18644158" y="39469938"/>
+                <a:ext cx="4482855" cy="2382215"/>
+              </a:xfrm>
+              <a:prstGeom prst="rect">
+                <a:avLst/>
+              </a:prstGeom>
+            </p:spPr>
+          </p:pic>
+        </p:grpSp>
+        <p:pic>
+          <p:nvPicPr>
+            <p:cNvPr id="2" name="Picture 1" descr="Ornl_hfir_sns_logo_vertical.png"/>
+            <p:cNvPicPr>
+              <a:picLocks noChangeAspect="1"/>
+            </p:cNvPicPr>
+            <p:nvPr/>
+          </p:nvPicPr>
+          <p:blipFill>
+            <a:blip r:embed="rId13" cstate="print">
+              <a:extLst>
+                <a:ext uri="{28A0092B-C50C-407E-A947-70E740481C1C}">
+                  <a14:useLocalDpi xmlns:a14="http://schemas.microsoft.com/office/drawing/2010/main" val="0"/>
+                </a:ext>
+              </a:extLst>
+            </a:blip>
+            <a:stretch>
+              <a:fillRect/>
+            </a:stretch>
+          </p:blipFill>
+          <p:spPr>
+            <a:xfrm>
+              <a:off x="14399270" y="39619905"/>
+              <a:ext cx="3960440" cy="1957769"/>
+            </a:xfrm>
+            <a:prstGeom prst="rect">
+              <a:avLst/>
+            </a:prstGeom>
+          </p:spPr>
+        </p:pic>
+      </p:grpSp>
       <p:pic>
         <p:nvPicPr>
           <p:cNvPr id="6" name="Picture 5" descr="Mantid_Logo_with_icon.png"/>
@@ -8997,7 +9276,7 @@
           <p:nvPr/>
         </p:nvPicPr>
         <p:blipFill>
-          <a:blip r:embed="rId16">
+          <a:blip r:embed="rId14">
             <a:extLst>
               <a:ext uri="{28A0092B-C50C-407E-A947-70E740481C1C}">
                 <a14:useLocalDpi xmlns:a14="http://schemas.microsoft.com/office/drawing/2010/main" val="0"/>

</xml_diff>

<commit_message>
Add Jon to poster name list
</commit_message>
<xml_diff>
--- a/Presentations/ECNS 2015/SCDPoster.pptx
+++ b/Presentations/ECNS 2015/SCDPoster.pptx
@@ -142,7 +142,7 @@
   </p:defaultTextStyle>
   <p:extLst>
     <p:ext uri="{EFAFB233-063F-42B5-8137-9DF3F51BA10A}">
-      <p15:sldGuideLst xmlns:p15="http://schemas.microsoft.com/office/powerpoint/2012/main" xmlns="">
+      <p15:sldGuideLst xmlns="" xmlns:p15="http://schemas.microsoft.com/office/powerpoint/2012/main">
         <p15:guide id="1" orient="horz" pos="13488">
           <p15:clr>
             <a:srgbClr val="A4A3A4"/>
@@ -156,7 +156,7 @@
       </p15:sldGuideLst>
     </p:ext>
     <p:ext uri="{2D200454-40CA-4A62-9FC3-DE9A4176ACB9}">
-      <p15:notesGuideLst xmlns:p15="http://schemas.microsoft.com/office/powerpoint/2012/main" xmlns="">
+      <p15:notesGuideLst xmlns="" xmlns:p15="http://schemas.microsoft.com/office/powerpoint/2012/main">
         <p15:guide id="1" orient="horz" pos="3127">
           <p15:clr>
             <a:srgbClr val="A4A3A4"/>
@@ -256,7 +256,7 @@
             <a:fld id="{E78E1D5F-7523-4815-A670-60864F601D30}" type="datetimeFigureOut">
               <a:rPr lang="en-GB" smtClean="0"/>
               <a:pPr/>
-              <a:t>18/08/15</a:t>
+              <a:t>21/08/15</a:t>
             </a:fld>
             <a:endParaRPr lang="en-GB"/>
           </a:p>
@@ -423,7 +423,7 @@
             <a:fld id="{376B4F07-E738-4DFD-883D-BE3839CD703B}" type="datetimeFigureOut">
               <a:rPr lang="en-GB" smtClean="0"/>
               <a:pPr/>
-              <a:t>18/08/15</a:t>
+              <a:t>21/08/15</a:t>
             </a:fld>
             <a:endParaRPr lang="en-GB"/>
           </a:p>
@@ -3277,31 +3277,7 @@
                           <a:ea typeface="+mn-ea"/>
                           <a:cs typeface="+mn-cs"/>
                         </a:rPr>
-                        <a:t>(TOF) sources, particularly for single crystal diffraction </a:t>
-                      </a:r>
-                      <a:r>
-                        <a:rPr lang="en-GB" sz="2400" kern="1200" dirty="0" smtClean="0">
-                          <a:solidFill>
-                            <a:schemeClr val="tx1"/>
-                          </a:solidFill>
-                          <a:effectLst/>
-                          <a:latin typeface="+mn-lt"/>
-                          <a:ea typeface="+mn-ea"/>
-                          <a:cs typeface="+mn-cs"/>
-                        </a:rPr>
-                        <a:t>experiments. </a:t>
-                      </a:r>
-                      <a:r>
-                        <a:rPr lang="en-GB" sz="2400" kern="1200" dirty="0" smtClean="0">
-                          <a:solidFill>
-                            <a:schemeClr val="tx1"/>
-                          </a:solidFill>
-                          <a:effectLst/>
-                          <a:latin typeface="+mn-lt"/>
-                          <a:ea typeface="+mn-ea"/>
-                          <a:cs typeface="+mn-cs"/>
-                        </a:rPr>
-                        <a:t>Increasingly, and particularly in single crystal diffraction (SCD), the correct treatment of data as part of data reduction and analysis, for a range of techniques, involves the efficient and flexible processing of large n-dimensional datasets.</a:t>
+                        <a:t>(TOF) sources, particularly for single crystal diffraction experiments. Increasingly, and particularly in single crystal diffraction (SCD), the correct treatment of data as part of data reduction and analysis, for a range of techniques, involves the efficient and flexible processing of large n-dimensional datasets.</a:t>
                       </a:r>
                     </a:p>
                     <a:p>
@@ -3758,10 +3734,10 @@
                           <a:ea typeface="+mn-ea"/>
                           <a:cs typeface="Arial"/>
                         </a:rPr>
-                        <a:t>This has required engineering and innovations on both the Mantid and VTK side of the project</a:t>
-                      </a:r>
-                      <a:r>
-                        <a:rPr lang="en-GB" sz="2400" b="0" i="0" kern="1200" baseline="0" dirty="0" smtClean="0">
+                        <a:t>This has required engineering and innovations on both the Mantid and VTK side of the project. We have been working with </a:t>
+                      </a:r>
+                      <a:r>
+                        <a:rPr lang="en-GB" sz="2400" b="0" i="0" kern="1200" baseline="0" dirty="0" err="1" smtClean="0">
                           <a:solidFill>
                             <a:schemeClr val="tx1"/>
                           </a:solidFill>
@@ -3770,10 +3746,10 @@
                           <a:ea typeface="+mn-ea"/>
                           <a:cs typeface="Arial"/>
                         </a:rPr>
-                        <a:t>. We have been working with </a:t>
-                      </a:r>
-                      <a:r>
-                        <a:rPr lang="en-GB" sz="2400" b="0" i="0" kern="1200" baseline="0" dirty="0" err="1" smtClean="0">
+                        <a:t>Kitware</a:t>
+                      </a:r>
+                      <a:r>
+                        <a:rPr lang="en-GB" sz="2400" b="0" i="0" kern="1200" baseline="0" dirty="0" smtClean="0">
                           <a:solidFill>
                             <a:schemeClr val="tx1"/>
                           </a:solidFill>
@@ -3782,10 +3758,10 @@
                           <a:ea typeface="+mn-ea"/>
                           <a:cs typeface="Arial"/>
                         </a:rPr>
-                        <a:t>Kitware</a:t>
-                      </a:r>
-                      <a:r>
-                        <a:rPr lang="en-GB" sz="2400" b="0" i="0" kern="1200" baseline="0" dirty="0" smtClean="0">
+                        <a:t>, the developers of </a:t>
+                      </a:r>
+                      <a:r>
+                        <a:rPr lang="en-GB" sz="2400" b="0" i="0" kern="1200" baseline="0" dirty="0" err="1" smtClean="0">
                           <a:solidFill>
                             <a:schemeClr val="tx1"/>
                           </a:solidFill>
@@ -3794,10 +3770,10 @@
                           <a:ea typeface="+mn-ea"/>
                           <a:cs typeface="Arial"/>
                         </a:rPr>
-                        <a:t>, the developers of </a:t>
-                      </a:r>
-                      <a:r>
-                        <a:rPr lang="en-GB" sz="2400" b="0" i="0" kern="1200" baseline="0" dirty="0" err="1" smtClean="0">
+                        <a:t>ParaView</a:t>
+                      </a:r>
+                      <a:r>
+                        <a:rPr lang="en-GB" sz="2400" b="0" i="0" kern="1200" baseline="0" dirty="0" smtClean="0">
                           <a:solidFill>
                             <a:schemeClr val="tx1"/>
                           </a:solidFill>
@@ -3806,29 +3782,8 @@
                           <a:ea typeface="+mn-ea"/>
                           <a:cs typeface="Arial"/>
                         </a:rPr>
-                        <a:t>ParaView</a:t>
-                      </a:r>
-                      <a:r>
-                        <a:rPr lang="en-GB" sz="2400" b="0" i="0" kern="1200" baseline="0" dirty="0" smtClean="0">
-                          <a:solidFill>
-                            <a:schemeClr val="tx1"/>
-                          </a:solidFill>
-                          <a:effectLst/>
-                          <a:latin typeface="+mn-lt"/>
-                          <a:ea typeface="+mn-ea"/>
-                          <a:cs typeface="Arial"/>
-                        </a:rPr>
                         <a:t>, to extend the capabilities of their visualization tools.</a:t>
                       </a:r>
-                      <a:endParaRPr lang="en-GB" sz="2400" b="0" i="0" kern="1200" baseline="0" dirty="0" smtClean="0">
-                        <a:solidFill>
-                          <a:schemeClr val="tx1"/>
-                        </a:solidFill>
-                        <a:effectLst/>
-                        <a:latin typeface="+mn-lt"/>
-                        <a:ea typeface="+mn-ea"/>
-                        <a:cs typeface="Arial"/>
-                      </a:endParaRPr>
                     </a:p>
                     <a:p>
                       <a:endParaRPr kumimoji="0" lang="en-GB" sz="2400" b="0" i="0" u="none" strike="noStrike" kern="1200" cap="none" normalizeH="0" baseline="0" dirty="0" smtClean="0">
@@ -3907,31 +3862,7 @@
                           <a:ea typeface="+mn-ea"/>
                           <a:cs typeface="+mn-cs"/>
                         </a:rPr>
-                        <a:t> stores </a:t>
-                      </a:r>
-                      <a:r>
-                        <a:rPr lang="en-GB" sz="2400" b="0" i="0" kern="1200" dirty="0" smtClean="0">
-                          <a:solidFill>
-                            <a:schemeClr val="tx1"/>
-                          </a:solidFill>
-                          <a:effectLst/>
-                          <a:latin typeface="+mn-lt"/>
-                          <a:ea typeface="+mn-ea"/>
-                          <a:cs typeface="+mn-cs"/>
-                        </a:rPr>
-                        <a:t>its </a:t>
-                      </a:r>
-                      <a:r>
-                        <a:rPr lang="en-GB" sz="2400" b="0" i="0" kern="1200" dirty="0" smtClean="0">
-                          <a:solidFill>
-                            <a:schemeClr val="tx1"/>
-                          </a:solidFill>
-                          <a:effectLst/>
-                          <a:latin typeface="+mn-lt"/>
-                          <a:ea typeface="+mn-ea"/>
-                          <a:cs typeface="+mn-cs"/>
-                        </a:rPr>
-                        <a:t>data in structures known as Workspaces.</a:t>
+                        <a:t> stores its data in structures known as Workspaces.</a:t>
                       </a:r>
                       <a:r>
                         <a:rPr lang="en-GB" sz="2400" b="0" i="0" kern="1200" baseline="0" dirty="0" smtClean="0">
@@ -5009,19 +4940,7 @@
                           <a:ea typeface="+mn-ea"/>
                           <a:cs typeface="+mn-cs"/>
                         </a:rPr>
-                        <a:t>, </a:t>
-                      </a:r>
-                      <a:r>
-                        <a:rPr lang="en-GB" sz="2400" b="0" i="0" kern="1200" dirty="0" smtClean="0">
-                          <a:solidFill>
-                            <a:schemeClr val="tx1"/>
-                          </a:solidFill>
-                          <a:effectLst/>
-                          <a:latin typeface="+mn-lt"/>
-                          <a:ea typeface="+mn-ea"/>
-                          <a:cs typeface="+mn-cs"/>
-                        </a:rPr>
-                        <a:t>as it gives higher resolution in the regions of the Bragg peaks at an overall low memory cost. </a:t>
+                        <a:t>, as it gives higher resolution in the regions of the Bragg peaks at an overall low memory cost. </a:t>
                       </a:r>
                     </a:p>
                     <a:p>
@@ -5817,37 +5736,7 @@
                           <a:ea typeface="+mn-ea"/>
                           <a:cs typeface="Symbol" charset="2"/>
                         </a:rPr>
-                        <a:t>. </a:t>
-                      </a:r>
-                      <a:r>
-                        <a:rPr kumimoji="0" lang="en-US" sz="2400" b="0" i="0" u="none" strike="noStrike" kern="0" cap="none" normalizeH="0" baseline="0" dirty="0" smtClean="0">
-                          <a:ln>
-                            <a:noFill/>
-                          </a:ln>
-                          <a:solidFill>
-                            <a:srgbClr val="000000"/>
-                          </a:solidFill>
-                          <a:effectLst/>
-                          <a:latin typeface="+mn-lt"/>
-                          <a:ea typeface="+mn-ea"/>
-                          <a:cs typeface="Symbol" charset="2"/>
-                        </a:rPr>
-                        <a:t>Correctly </a:t>
-                      </a:r>
-                      <a:r>
-                        <a:rPr kumimoji="0" lang="en-US" sz="2400" b="0" i="0" u="none" strike="noStrike" kern="0" cap="none" normalizeH="0" baseline="0" dirty="0" smtClean="0">
-                          <a:ln>
-                            <a:noFill/>
-                          </a:ln>
-                          <a:solidFill>
-                            <a:srgbClr val="000000"/>
-                          </a:solidFill>
-                          <a:effectLst/>
-                          <a:latin typeface="+mn-lt"/>
-                          <a:ea typeface="+mn-ea"/>
-                          <a:cs typeface="Symbol" charset="2"/>
-                        </a:rPr>
-                        <a:t>normalizing and summing data from multiple experimental means tracking and separating the counts separately from the flux and solid angle contributions from each detector. Our solution is to calculate and sum the flux and solid angle contributions to each bin in reciprocal space across all scans, which we designate our normalization workspace. The counts for each run can then be summed and divided by our normalization workspace. The process of generating the normalization workspace can be expensive as we need to calculate the integrated flux between two wave vectors for every trajectory passing through a bin in our reciprocal data space. We have applied optimizations to the algorithms to improve speed and reduce memory. Our computed normalization workspace also acts as a planning tool, and we can use it to design experiments prior to beam time.</a:t>
+                        <a:t>. Correctly normalizing and summing data from multiple experimental means tracking and separating the counts separately from the flux and solid angle contributions from each detector. Our solution is to calculate and sum the flux and solid angle contributions to each bin in reciprocal space across all scans, which we designate our normalization workspace. The counts for each run can then be summed and divided by our normalization workspace. The process of generating the normalization workspace can be expensive as we need to calculate the integrated flux between two wave vectors for every trajectory passing through a bin in our reciprocal data space. We have applied optimizations to the algorithms to improve speed and reduce memory. Our computed normalization workspace also acts as a planning tool, and we can use it to design experiments prior to beam time.</a:t>
                       </a:r>
                     </a:p>
                     <a:p>
@@ -6334,31 +6223,8 @@
                           <a:effectLst/>
                           <a:latin typeface="+mn-lt"/>
                         </a:rPr>
-                        <a:t> and can drive the analysis as well as passively observe changes to underlying data</a:t>
-                      </a:r>
-                      <a:r>
-                        <a:rPr kumimoji="0" lang="en-US" sz="2400" b="0" i="0" u="none" strike="noStrike" kern="0" cap="none" normalizeH="0" baseline="0" dirty="0" smtClean="0">
-                          <a:ln>
-                            <a:noFill/>
-                          </a:ln>
-                          <a:solidFill>
-                            <a:schemeClr val="tx1"/>
-                          </a:solidFill>
-                          <a:effectLst/>
-                          <a:latin typeface="+mn-lt"/>
-                        </a:rPr>
-                        <a:t>.</a:t>
-                      </a:r>
-                      <a:endParaRPr kumimoji="0" lang="en-US" sz="2400" b="0" i="0" u="none" strike="noStrike" kern="0" cap="none" normalizeH="0" baseline="0" dirty="0" smtClean="0">
-                        <a:ln>
-                          <a:noFill/>
-                        </a:ln>
-                        <a:solidFill>
-                          <a:schemeClr val="tx1"/>
-                        </a:solidFill>
-                        <a:effectLst/>
-                        <a:latin typeface="+mn-lt"/>
-                      </a:endParaRPr>
+                        <a:t> and can drive the analysis as well as passively observe changes to underlying data.</a:t>
+                      </a:r>
                     </a:p>
                     <a:p>
                       <a:pPr marL="0" marR="0" lvl="0" indent="0" algn="l" defTabSz="4173538" rtl="0" eaLnBrk="1" fontAlgn="base" latinLnBrk="0" hangingPunct="1">
@@ -7067,19 +6933,7 @@
                           <a:ea typeface="+mn-ea"/>
                           <a:cs typeface="Arial"/>
                         </a:rPr>
-                        <a:t> is actively being developed.  Frequent meetings with instrument scientists continue to provide a steady stream of additional requirements and challenges</a:t>
-                      </a:r>
-                      <a:r>
-                        <a:rPr lang="en-GB" sz="2400" b="0" i="0" kern="1200" dirty="0" smtClean="0">
-                          <a:solidFill>
-                            <a:schemeClr val="tx1"/>
-                          </a:solidFill>
-                          <a:effectLst/>
-                          <a:latin typeface="+mn-lt"/>
-                          <a:ea typeface="+mn-ea"/>
-                          <a:cs typeface="Arial"/>
-                        </a:rPr>
-                        <a:t>.</a:t>
+                        <a:t> is actively being developed.  Frequent meetings with instrument scientists continue to provide a steady stream of additional requirements and challenges.</a:t>
                       </a:r>
                     </a:p>
                     <a:p>
@@ -7104,67 +6958,7 @@
                           <a:ea typeface="+mn-ea"/>
                           <a:cs typeface="+mn-cs"/>
                         </a:rPr>
-                        <a:t>New </a:t>
-                      </a:r>
-                      <a:r>
-                        <a:rPr lang="en-GB" sz="2400" b="0" i="0" kern="1200" baseline="0" dirty="0" smtClean="0">
-                          <a:solidFill>
-                            <a:schemeClr val="tx1"/>
-                          </a:solidFill>
-                          <a:effectLst/>
-                          <a:latin typeface="+mn-lt"/>
-                          <a:ea typeface="+mn-ea"/>
-                          <a:cs typeface="+mn-cs"/>
-                        </a:rPr>
-                        <a:t>developments in hardware </a:t>
-                      </a:r>
-                      <a:r>
-                        <a:rPr lang="en-GB" sz="2400" b="0" i="0" kern="1200" baseline="0" dirty="0" smtClean="0">
-                          <a:solidFill>
-                            <a:schemeClr val="tx1"/>
-                          </a:solidFill>
-                          <a:effectLst/>
-                          <a:latin typeface="+mn-lt"/>
-                          <a:ea typeface="+mn-ea"/>
-                          <a:cs typeface="+mn-cs"/>
-                        </a:rPr>
-                        <a:t>continually lead </a:t>
-                      </a:r>
-                      <a:r>
-                        <a:rPr lang="en-GB" sz="2400" b="0" i="0" kern="1200" baseline="0" dirty="0" smtClean="0">
-                          <a:solidFill>
-                            <a:schemeClr val="tx1"/>
-                          </a:solidFill>
-                          <a:effectLst/>
-                          <a:latin typeface="+mn-lt"/>
-                          <a:ea typeface="+mn-ea"/>
-                          <a:cs typeface="+mn-cs"/>
-                        </a:rPr>
-                        <a:t>to higher data rates. The introduction of the ESS into the collaboration will </a:t>
-                      </a:r>
-                      <a:r>
-                        <a:rPr lang="en-GB" sz="2400" b="0" i="0" kern="1200" baseline="0" dirty="0" smtClean="0">
-                          <a:solidFill>
-                            <a:schemeClr val="tx1"/>
-                          </a:solidFill>
-                          <a:effectLst/>
-                          <a:latin typeface="+mn-lt"/>
-                          <a:ea typeface="+mn-ea"/>
-                          <a:cs typeface="+mn-cs"/>
-                        </a:rPr>
-                        <a:t>push further our </a:t>
-                      </a:r>
-                      <a:r>
-                        <a:rPr lang="en-GB" sz="2400" b="0" i="0" kern="1200" baseline="0" dirty="0" smtClean="0">
-                          <a:solidFill>
-                            <a:schemeClr val="tx1"/>
-                          </a:solidFill>
-                          <a:effectLst/>
-                          <a:latin typeface="+mn-lt"/>
-                          <a:ea typeface="+mn-ea"/>
-                          <a:cs typeface="+mn-cs"/>
-                        </a:rPr>
-                        <a:t>existing methodologies.</a:t>
+                        <a:t>New developments in hardware continually lead to higher data rates. The introduction of the ESS into the collaboration will push further our existing methodologies.</a:t>
                       </a:r>
                     </a:p>
                     <a:p>
@@ -7351,31 +7145,7 @@
                           <a:ea typeface="+mn-ea"/>
                           <a:cs typeface="Arial"/>
                         </a:rPr>
-                        <a:t>[</a:t>
-                      </a:r>
-                      <a:r>
-                        <a:rPr lang="en-GB" sz="1800" kern="1200" dirty="0" smtClean="0">
-                          <a:solidFill>
-                            <a:schemeClr val="tx1"/>
-                          </a:solidFill>
-                          <a:effectLst/>
-                          <a:latin typeface="Arial"/>
-                          <a:ea typeface="+mn-ea"/>
-                          <a:cs typeface="Arial"/>
-                        </a:rPr>
-                        <a:t>2</a:t>
-                      </a:r>
-                      <a:r>
-                        <a:rPr lang="en-GB" sz="1800" kern="1200" dirty="0" smtClean="0">
-                          <a:solidFill>
-                            <a:schemeClr val="tx1"/>
-                          </a:solidFill>
-                          <a:effectLst/>
-                          <a:latin typeface="Arial"/>
-                          <a:ea typeface="+mn-ea"/>
-                          <a:cs typeface="Arial"/>
-                        </a:rPr>
-                        <a:t>]</a:t>
+                        <a:t>[2]</a:t>
                       </a:r>
                       <a:r>
                         <a:rPr lang="en-US" sz="1800" kern="1200" dirty="0" smtClean="0">
@@ -7504,19 +7274,7 @@
                           <a:ea typeface="+mn-ea"/>
                           <a:cs typeface="Arial"/>
                         </a:rPr>
-                        <a:t>[</a:t>
-                      </a:r>
-                      <a:r>
-                        <a:rPr lang="en-GB" sz="1800" kern="1200" dirty="0" smtClean="0">
-                          <a:solidFill>
-                            <a:schemeClr val="tx1"/>
-                          </a:solidFill>
-                          <a:effectLst/>
-                          <a:latin typeface="Arial"/>
-                          <a:ea typeface="+mn-ea"/>
-                          <a:cs typeface="Arial"/>
-                        </a:rPr>
-                        <a:t>3] </a:t>
+                        <a:t>[3] </a:t>
                       </a:r>
                       <a:r>
                         <a:rPr lang="en-US" sz="1800" kern="1200" dirty="0" err="1" smtClean="0">
@@ -7960,8 +7718,8 @@
         </p:nvSpPr>
         <p:spPr bwMode="auto">
           <a:xfrm>
-            <a:off x="699838" y="6640241"/>
-            <a:ext cx="27813000" cy="2308324"/>
+            <a:off x="717750" y="6424217"/>
+            <a:ext cx="27813000" cy="2677656"/>
           </a:xfrm>
           <a:prstGeom prst="rect">
             <a:avLst/>
@@ -8305,6 +8063,30 @@
               </a:rPr>
               <a:t>, </a:t>
             </a:r>
+            <a:r>
+              <a:rPr lang="en-GB" dirty="0" smtClean="0">
+                <a:solidFill>
+                  <a:srgbClr val="002D55"/>
+                </a:solidFill>
+                <a:latin typeface="+mn-lt"/>
+              </a:rPr>
+              <a:t>Jon Taylor</a:t>
+            </a:r>
+            <a:r>
+              <a:rPr lang="en-GB" baseline="30000" dirty="0" smtClean="0">
+                <a:solidFill>
+                  <a:srgbClr val="002D55"/>
+                </a:solidFill>
+                <a:latin typeface="+mn-lt"/>
+              </a:rPr>
+              <a:t>4</a:t>
+            </a:r>
+            <a:endParaRPr lang="en-GB" baseline="30000" dirty="0" smtClean="0">
+              <a:solidFill>
+                <a:srgbClr val="002D55"/>
+              </a:solidFill>
+              <a:latin typeface="+mn-lt"/>
+            </a:endParaRPr>
           </a:p>
           <a:p>
             <a:pPr algn="ctr"/>
@@ -8345,8 +8127,23 @@
                 </a:solidFill>
                 <a:latin typeface="+mn-lt"/>
               </a:rPr>
-              <a:t>STFC Rutherford Appleton Laboratory, Oxfordshire, UK </a:t>
+              <a:t>STFC Rutherford Appleton Laboratory, Oxfordshire, </a:t>
             </a:r>
+            <a:r>
+              <a:rPr lang="en-GB" dirty="0" smtClean="0">
+                <a:solidFill>
+                  <a:srgbClr val="002D55"/>
+                </a:solidFill>
+                <a:latin typeface="+mn-lt"/>
+              </a:rPr>
+              <a:t>GB</a:t>
+            </a:r>
+            <a:endParaRPr lang="en-GB" dirty="0" smtClean="0">
+              <a:solidFill>
+                <a:srgbClr val="002D55"/>
+              </a:solidFill>
+              <a:latin typeface="+mn-lt"/>
+            </a:endParaRPr>
           </a:p>
           <a:p>
             <a:pPr algn="ctr"/>
@@ -8366,8 +8163,44 @@
                 </a:solidFill>
                 <a:latin typeface="+mn-lt"/>
               </a:rPr>
-              <a:t>Oak Ridge National Laboratory, Oak Ridge, Tennessee, USA</a:t>
+              <a:t>Oak Ridge National Laboratory, Oak Ridge, Tennessee, </a:t>
             </a:r>
+            <a:r>
+              <a:rPr lang="en-GB" dirty="0" smtClean="0">
+                <a:solidFill>
+                  <a:srgbClr val="002D55"/>
+                </a:solidFill>
+                <a:latin typeface="+mn-lt"/>
+              </a:rPr>
+              <a:t>US</a:t>
+            </a:r>
+          </a:p>
+          <a:p>
+            <a:pPr algn="ctr"/>
+            <a:r>
+              <a:rPr lang="en-GB" baseline="30000" dirty="0" smtClean="0">
+                <a:solidFill>
+                  <a:srgbClr val="002D55"/>
+                </a:solidFill>
+                <a:latin typeface="+mn-lt"/>
+              </a:rPr>
+              <a:t>4</a:t>
+            </a:r>
+            <a:r>
+              <a:rPr lang="en-GB" dirty="0" smtClean="0">
+                <a:solidFill>
+                  <a:srgbClr val="002D55"/>
+                </a:solidFill>
+                <a:latin typeface="+mn-lt"/>
+              </a:rPr>
+              <a:t>European Spallation Source, Lund, SE</a:t>
+            </a:r>
+            <a:endParaRPr lang="en-GB" dirty="0" smtClean="0">
+              <a:solidFill>
+                <a:srgbClr val="002D55"/>
+              </a:solidFill>
+              <a:latin typeface="+mn-lt"/>
+            </a:endParaRPr>
           </a:p>
           <a:p>
             <a:pPr algn="ctr"/>

</xml_diff>